<commit_message>
doc: use "ACRN configurator" name in Overview, GSG
Replaced "ACRN configuration editor" name with "ACRN configurator" in text to match the recently renamed acrn_configurator.py.

Signed-off-by: amyreye <amy.reyes@intel.com>
</commit_message>
<xml_diff>
--- a/doc/getting-started/images/gsg_overview_image_sources.pptx
+++ b/doc/getting-started/images/gsg_overview_image_sources.pptx
@@ -227,7 +227,7 @@
           <a:p>
             <a:fld id="{7F1928CD-4886-4D7A-8E95-01414A88447B}" type="datetimeFigureOut">
               <a:rPr lang="en-US" smtClean="0"/>
-              <a:t>8/18/2021</a:t>
+              <a:t>8/25/2021</a:t>
             </a:fld>
             <a:endParaRPr lang="en-US"/>
           </a:p>
@@ -893,7 +893,7 @@
           <a:p>
             <a:fld id="{8C9E4E1E-7BB0-4B1A-B1C8-E7E401F43F63}" type="datetimeFigureOut">
               <a:rPr lang="en-US" smtClean="0"/>
-              <a:t>8/18/2021</a:t>
+              <a:t>8/25/2021</a:t>
             </a:fld>
             <a:endParaRPr lang="en-US"/>
           </a:p>
@@ -1091,7 +1091,7 @@
           <a:p>
             <a:fld id="{8C9E4E1E-7BB0-4B1A-B1C8-E7E401F43F63}" type="datetimeFigureOut">
               <a:rPr lang="en-US" smtClean="0"/>
-              <a:t>8/18/2021</a:t>
+              <a:t>8/25/2021</a:t>
             </a:fld>
             <a:endParaRPr lang="en-US"/>
           </a:p>
@@ -1299,7 +1299,7 @@
           <a:p>
             <a:fld id="{8C9E4E1E-7BB0-4B1A-B1C8-E7E401F43F63}" type="datetimeFigureOut">
               <a:rPr lang="en-US" smtClean="0"/>
-              <a:t>8/18/2021</a:t>
+              <a:t>8/25/2021</a:t>
             </a:fld>
             <a:endParaRPr lang="en-US"/>
           </a:p>
@@ -1497,7 +1497,7 @@
           <a:p>
             <a:fld id="{8C9E4E1E-7BB0-4B1A-B1C8-E7E401F43F63}" type="datetimeFigureOut">
               <a:rPr lang="en-US" smtClean="0"/>
-              <a:t>8/18/2021</a:t>
+              <a:t>8/25/2021</a:t>
             </a:fld>
             <a:endParaRPr lang="en-US"/>
           </a:p>
@@ -1772,7 +1772,7 @@
           <a:p>
             <a:fld id="{8C9E4E1E-7BB0-4B1A-B1C8-E7E401F43F63}" type="datetimeFigureOut">
               <a:rPr lang="en-US" smtClean="0"/>
-              <a:t>8/18/2021</a:t>
+              <a:t>8/25/2021</a:t>
             </a:fld>
             <a:endParaRPr lang="en-US"/>
           </a:p>
@@ -2037,7 +2037,7 @@
           <a:p>
             <a:fld id="{8C9E4E1E-7BB0-4B1A-B1C8-E7E401F43F63}" type="datetimeFigureOut">
               <a:rPr lang="en-US" smtClean="0"/>
-              <a:t>8/18/2021</a:t>
+              <a:t>8/25/2021</a:t>
             </a:fld>
             <a:endParaRPr lang="en-US"/>
           </a:p>
@@ -2449,7 +2449,7 @@
           <a:p>
             <a:fld id="{8C9E4E1E-7BB0-4B1A-B1C8-E7E401F43F63}" type="datetimeFigureOut">
               <a:rPr lang="en-US" smtClean="0"/>
-              <a:t>8/18/2021</a:t>
+              <a:t>8/25/2021</a:t>
             </a:fld>
             <a:endParaRPr lang="en-US"/>
           </a:p>
@@ -2590,7 +2590,7 @@
           <a:p>
             <a:fld id="{8C9E4E1E-7BB0-4B1A-B1C8-E7E401F43F63}" type="datetimeFigureOut">
               <a:rPr lang="en-US" smtClean="0"/>
-              <a:t>8/18/2021</a:t>
+              <a:t>8/25/2021</a:t>
             </a:fld>
             <a:endParaRPr lang="en-US"/>
           </a:p>
@@ -2703,7 +2703,7 @@
           <a:p>
             <a:fld id="{8C9E4E1E-7BB0-4B1A-B1C8-E7E401F43F63}" type="datetimeFigureOut">
               <a:rPr lang="en-US" smtClean="0"/>
-              <a:t>8/18/2021</a:t>
+              <a:t>8/25/2021</a:t>
             </a:fld>
             <a:endParaRPr lang="en-US"/>
           </a:p>
@@ -3014,7 +3014,7 @@
           <a:p>
             <a:fld id="{8C9E4E1E-7BB0-4B1A-B1C8-E7E401F43F63}" type="datetimeFigureOut">
               <a:rPr lang="en-US" smtClean="0"/>
-              <a:t>8/18/2021</a:t>
+              <a:t>8/25/2021</a:t>
             </a:fld>
             <a:endParaRPr lang="en-US"/>
           </a:p>
@@ -3302,7 +3302,7 @@
           <a:p>
             <a:fld id="{8C9E4E1E-7BB0-4B1A-B1C8-E7E401F43F63}" type="datetimeFigureOut">
               <a:rPr lang="en-US" smtClean="0"/>
-              <a:t>8/18/2021</a:t>
+              <a:t>8/25/2021</a:t>
             </a:fld>
             <a:endParaRPr lang="en-US"/>
           </a:p>
@@ -3543,7 +3543,7 @@
           <a:p>
             <a:fld id="{8C9E4E1E-7BB0-4B1A-B1C8-E7E401F43F63}" type="datetimeFigureOut">
               <a:rPr lang="en-US" smtClean="0"/>
-              <a:t>8/18/2021</a:t>
+              <a:t>8/25/2021</a:t>
             </a:fld>
             <a:endParaRPr lang="en-US"/>
           </a:p>
@@ -4842,7 +4842,7 @@
                   <a:ea typeface="Intel Clear" panose="020B0604020203020204" pitchFamily="34" charset="0"/>
                   <a:cs typeface="Intel Clear" panose="020B0604020203020204" pitchFamily="34" charset="0"/>
                 </a:rPr>
-                <a:t>Use configuration editor tool to generate scenario configuration file and launch scripts on development computer</a:t>
+                <a:t>Use ACRN configurator to generate scenario configuration file and launch scripts on development computer</a:t>
               </a:r>
             </a:p>
           </p:txBody>
@@ -9319,15 +9319,6 @@
 </file>
 
 <file path=customXml/item1.xml><?xml version="1.0" encoding="utf-8"?>
-<?mso-contentType ?>
-<FormTemplates xmlns="http://schemas.microsoft.com/sharepoint/v3/contenttype/forms">
-  <Display>DocumentLibraryForm</Display>
-  <Edit>DocumentLibraryForm</Edit>
-  <New>DocumentLibraryForm</New>
-</FormTemplates>
-</file>
-
-<file path=customXml/item2.xml><?xml version="1.0" encoding="utf-8"?>
 <ct:contentTypeSchema xmlns:ct="http://schemas.microsoft.com/office/2006/metadata/contentType" xmlns:ma="http://schemas.microsoft.com/office/2006/metadata/properties/metaAttributes" ct:_="" ma:_="" ma:contentTypeName="Document" ma:contentTypeID="0x0101007C976059B38EB9478B8A870058902DEC" ma:contentTypeVersion="14" ma:contentTypeDescription="Create a new document." ma:contentTypeScope="" ma:versionID="05ba9921994b21fdcf03ff90d8d0702b">
   <xsd:schema xmlns:xsd="http://www.w3.org/2001/XMLSchema" xmlns:xs="http://www.w3.org/2001/XMLSchema" xmlns:p="http://schemas.microsoft.com/office/2006/metadata/properties" xmlns:ns2="d7ada8fa-2017-48cc-938a-cbfcf298b1ea" xmlns:ns3="57120940-f128-4520-8a16-a0e5923cb597" targetNamespace="http://schemas.microsoft.com/office/2006/metadata/properties" ma:root="true" ma:fieldsID="b8d1e5e83af543a46682fa0c2ea1bd1a" ns2:_="" ns3:_="">
     <xsd:import namespace="d7ada8fa-2017-48cc-938a-cbfcf298b1ea"/>
@@ -9558,6 +9549,15 @@
 </ct:contentTypeSchema>
 </file>
 
+<file path=customXml/item2.xml><?xml version="1.0" encoding="utf-8"?>
+<?mso-contentType ?>
+<FormTemplates xmlns="http://schemas.microsoft.com/sharepoint/v3/contenttype/forms">
+  <Display>DocumentLibraryForm</Display>
+  <Edit>DocumentLibraryForm</Edit>
+  <New>DocumentLibraryForm</New>
+</FormTemplates>
+</file>
+
 <file path=customXml/item3.xml><?xml version="1.0" encoding="utf-8"?>
 <p:properties xmlns:p="http://schemas.microsoft.com/office/2006/metadata/properties" xmlns:xsi="http://www.w3.org/2001/XMLSchema-instance" xmlns:pc="http://schemas.microsoft.com/office/infopath/2007/PartnerControls">
   <documentManagement>
@@ -9567,14 +9567,6 @@
 </file>
 
 <file path=customXml/itemProps1.xml><?xml version="1.0" encoding="utf-8"?>
-<ds:datastoreItem xmlns:ds="http://schemas.openxmlformats.org/officeDocument/2006/customXml" ds:itemID="{ECB7EDBC-7236-44C4-BEF3-A40BAF0A7D32}">
-  <ds:schemaRefs>
-    <ds:schemaRef ds:uri="http://schemas.microsoft.com/sharepoint/v3/contenttype/forms"/>
-  </ds:schemaRefs>
-</ds:datastoreItem>
-</file>
-
-<file path=customXml/itemProps2.xml><?xml version="1.0" encoding="utf-8"?>
 <ds:datastoreItem xmlns:ds="http://schemas.openxmlformats.org/officeDocument/2006/customXml" ds:itemID="{F1A9E806-27C6-4670-A107-4BE0C63AC0D0}">
   <ds:schemaRefs>
     <ds:schemaRef ds:uri="57120940-f128-4520-8a16-a0e5923cb597"/>
@@ -9589,6 +9581,14 @@
     <ds:schemaRef ds:uri="http://schemas.microsoft.com/office/infopath/2007/PartnerControls"/>
     <ds:schemaRef ds:uri="http://schemas.openxmlformats.org/package/2006/metadata/core-properties"/>
     <ds:schemaRef ds:uri="http://www.w3.org/2001/XMLSchema"/>
+  </ds:schemaRefs>
+</ds:datastoreItem>
+</file>
+
+<file path=customXml/itemProps2.xml><?xml version="1.0" encoding="utf-8"?>
+<ds:datastoreItem xmlns:ds="http://schemas.openxmlformats.org/officeDocument/2006/customXml" ds:itemID="{ECB7EDBC-7236-44C4-BEF3-A40BAF0A7D32}">
+  <ds:schemaRefs>
+    <ds:schemaRef ds:uri="http://schemas.microsoft.com/sharepoint/v3/contenttype/forms"/>
   </ds:schemaRefs>
 </ds:datastoreItem>
 </file>

</xml_diff>

<commit_message>
doc: update Overview with DX recommendations
- Capitalize Board Inspector and ACRN Configurator names to highlight them in images and content
- Remove duplicate links between the Overview and GSG where not needed
- Provide additional details that help to deepen developer’s knowledge where applicable.  Potential items: acrn-dm, more clarity of the relationship between the ServiceVM and UserVMs, expanded definitions of scenarios (beyond one liners).

Signed-off-by: Amy Reyes <amy.reyes@intel.com>
</commit_message>
<xml_diff>
--- a/doc/getting-started/images/gsg_overview_image_sources.pptx
+++ b/doc/getting-started/images/gsg_overview_image_sources.pptx
@@ -227,7 +227,7 @@
           <a:p>
             <a:fld id="{7F1928CD-4886-4D7A-8E95-01414A88447B}" type="datetimeFigureOut">
               <a:rPr lang="en-US" smtClean="0"/>
-              <a:t>8/25/2021</a:t>
+              <a:t>10/13/2021</a:t>
             </a:fld>
             <a:endParaRPr lang="en-US"/>
           </a:p>
@@ -893,7 +893,7 @@
           <a:p>
             <a:fld id="{8C9E4E1E-7BB0-4B1A-B1C8-E7E401F43F63}" type="datetimeFigureOut">
               <a:rPr lang="en-US" smtClean="0"/>
-              <a:t>8/25/2021</a:t>
+              <a:t>10/13/2021</a:t>
             </a:fld>
             <a:endParaRPr lang="en-US"/>
           </a:p>
@@ -1091,7 +1091,7 @@
           <a:p>
             <a:fld id="{8C9E4E1E-7BB0-4B1A-B1C8-E7E401F43F63}" type="datetimeFigureOut">
               <a:rPr lang="en-US" smtClean="0"/>
-              <a:t>8/25/2021</a:t>
+              <a:t>10/13/2021</a:t>
             </a:fld>
             <a:endParaRPr lang="en-US"/>
           </a:p>
@@ -1299,7 +1299,7 @@
           <a:p>
             <a:fld id="{8C9E4E1E-7BB0-4B1A-B1C8-E7E401F43F63}" type="datetimeFigureOut">
               <a:rPr lang="en-US" smtClean="0"/>
-              <a:t>8/25/2021</a:t>
+              <a:t>10/13/2021</a:t>
             </a:fld>
             <a:endParaRPr lang="en-US"/>
           </a:p>
@@ -1497,7 +1497,7 @@
           <a:p>
             <a:fld id="{8C9E4E1E-7BB0-4B1A-B1C8-E7E401F43F63}" type="datetimeFigureOut">
               <a:rPr lang="en-US" smtClean="0"/>
-              <a:t>8/25/2021</a:t>
+              <a:t>10/13/2021</a:t>
             </a:fld>
             <a:endParaRPr lang="en-US"/>
           </a:p>
@@ -1772,7 +1772,7 @@
           <a:p>
             <a:fld id="{8C9E4E1E-7BB0-4B1A-B1C8-E7E401F43F63}" type="datetimeFigureOut">
               <a:rPr lang="en-US" smtClean="0"/>
-              <a:t>8/25/2021</a:t>
+              <a:t>10/13/2021</a:t>
             </a:fld>
             <a:endParaRPr lang="en-US"/>
           </a:p>
@@ -2037,7 +2037,7 @@
           <a:p>
             <a:fld id="{8C9E4E1E-7BB0-4B1A-B1C8-E7E401F43F63}" type="datetimeFigureOut">
               <a:rPr lang="en-US" smtClean="0"/>
-              <a:t>8/25/2021</a:t>
+              <a:t>10/13/2021</a:t>
             </a:fld>
             <a:endParaRPr lang="en-US"/>
           </a:p>
@@ -2449,7 +2449,7 @@
           <a:p>
             <a:fld id="{8C9E4E1E-7BB0-4B1A-B1C8-E7E401F43F63}" type="datetimeFigureOut">
               <a:rPr lang="en-US" smtClean="0"/>
-              <a:t>8/25/2021</a:t>
+              <a:t>10/13/2021</a:t>
             </a:fld>
             <a:endParaRPr lang="en-US"/>
           </a:p>
@@ -2590,7 +2590,7 @@
           <a:p>
             <a:fld id="{8C9E4E1E-7BB0-4B1A-B1C8-E7E401F43F63}" type="datetimeFigureOut">
               <a:rPr lang="en-US" smtClean="0"/>
-              <a:t>8/25/2021</a:t>
+              <a:t>10/13/2021</a:t>
             </a:fld>
             <a:endParaRPr lang="en-US"/>
           </a:p>
@@ -2703,7 +2703,7 @@
           <a:p>
             <a:fld id="{8C9E4E1E-7BB0-4B1A-B1C8-E7E401F43F63}" type="datetimeFigureOut">
               <a:rPr lang="en-US" smtClean="0"/>
-              <a:t>8/25/2021</a:t>
+              <a:t>10/13/2021</a:t>
             </a:fld>
             <a:endParaRPr lang="en-US"/>
           </a:p>
@@ -3014,7 +3014,7 @@
           <a:p>
             <a:fld id="{8C9E4E1E-7BB0-4B1A-B1C8-E7E401F43F63}" type="datetimeFigureOut">
               <a:rPr lang="en-US" smtClean="0"/>
-              <a:t>8/25/2021</a:t>
+              <a:t>10/13/2021</a:t>
             </a:fld>
             <a:endParaRPr lang="en-US"/>
           </a:p>
@@ -3302,7 +3302,7 @@
           <a:p>
             <a:fld id="{8C9E4E1E-7BB0-4B1A-B1C8-E7E401F43F63}" type="datetimeFigureOut">
               <a:rPr lang="en-US" smtClean="0"/>
-              <a:t>8/25/2021</a:t>
+              <a:t>10/13/2021</a:t>
             </a:fld>
             <a:endParaRPr lang="en-US"/>
           </a:p>
@@ -3543,7 +3543,7 @@
           <a:p>
             <a:fld id="{8C9E4E1E-7BB0-4B1A-B1C8-E7E401F43F63}" type="datetimeFigureOut">
               <a:rPr lang="en-US" smtClean="0"/>
-              <a:t>8/25/2021</a:t>
+              <a:t>10/13/2021</a:t>
             </a:fld>
             <a:endParaRPr lang="en-US"/>
           </a:p>
@@ -4787,7 +4787,7 @@
                   <a:ea typeface="Intel Clear" panose="020B0604020203020204" pitchFamily="34" charset="0"/>
                   <a:cs typeface="Intel Clear" panose="020B0604020203020204" pitchFamily="34" charset="0"/>
                 </a:rPr>
-                <a:t>Install OS on target, use board inspector tool to generate board configuration file</a:t>
+                <a:t>Install OS on target, use Board Inspector to generate board configuration file</a:t>
               </a:r>
             </a:p>
           </p:txBody>
@@ -4842,7 +4842,7 @@
                   <a:ea typeface="Intel Clear" panose="020B0604020203020204" pitchFamily="34" charset="0"/>
                   <a:cs typeface="Intel Clear" panose="020B0604020203020204" pitchFamily="34" charset="0"/>
                 </a:rPr>
-                <a:t>Use ACRN configurator to generate scenario configuration file and launch scripts on development computer</a:t>
+                <a:t>Use ACRN Configurator to generate scenario configuration file and launch scripts on development computer</a:t>
               </a:r>
             </a:p>
           </p:txBody>
@@ -9319,6 +9319,15 @@
 </file>
 
 <file path=customXml/item1.xml><?xml version="1.0" encoding="utf-8"?>
+<?mso-contentType ?>
+<FormTemplates xmlns="http://schemas.microsoft.com/sharepoint/v3/contenttype/forms">
+  <Display>DocumentLibraryForm</Display>
+  <Edit>DocumentLibraryForm</Edit>
+  <New>DocumentLibraryForm</New>
+</FormTemplates>
+</file>
+
+<file path=customXml/item2.xml><?xml version="1.0" encoding="utf-8"?>
 <ct:contentTypeSchema xmlns:ct="http://schemas.microsoft.com/office/2006/metadata/contentType" xmlns:ma="http://schemas.microsoft.com/office/2006/metadata/properties/metaAttributes" ct:_="" ma:_="" ma:contentTypeName="Document" ma:contentTypeID="0x0101007C976059B38EB9478B8A870058902DEC" ma:contentTypeVersion="14" ma:contentTypeDescription="Create a new document." ma:contentTypeScope="" ma:versionID="05ba9921994b21fdcf03ff90d8d0702b">
   <xsd:schema xmlns:xsd="http://www.w3.org/2001/XMLSchema" xmlns:xs="http://www.w3.org/2001/XMLSchema" xmlns:p="http://schemas.microsoft.com/office/2006/metadata/properties" xmlns:ns2="d7ada8fa-2017-48cc-938a-cbfcf298b1ea" xmlns:ns3="57120940-f128-4520-8a16-a0e5923cb597" targetNamespace="http://schemas.microsoft.com/office/2006/metadata/properties" ma:root="true" ma:fieldsID="b8d1e5e83af543a46682fa0c2ea1bd1a" ns2:_="" ns3:_="">
     <xsd:import namespace="d7ada8fa-2017-48cc-938a-cbfcf298b1ea"/>
@@ -9549,15 +9558,6 @@
 </ct:contentTypeSchema>
 </file>
 
-<file path=customXml/item2.xml><?xml version="1.0" encoding="utf-8"?>
-<?mso-contentType ?>
-<FormTemplates xmlns="http://schemas.microsoft.com/sharepoint/v3/contenttype/forms">
-  <Display>DocumentLibraryForm</Display>
-  <Edit>DocumentLibraryForm</Edit>
-  <New>DocumentLibraryForm</New>
-</FormTemplates>
-</file>
-
 <file path=customXml/item3.xml><?xml version="1.0" encoding="utf-8"?>
 <p:properties xmlns:p="http://schemas.microsoft.com/office/2006/metadata/properties" xmlns:xsi="http://www.w3.org/2001/XMLSchema-instance" xmlns:pc="http://schemas.microsoft.com/office/infopath/2007/PartnerControls">
   <documentManagement>
@@ -9567,6 +9567,14 @@
 </file>
 
 <file path=customXml/itemProps1.xml><?xml version="1.0" encoding="utf-8"?>
+<ds:datastoreItem xmlns:ds="http://schemas.openxmlformats.org/officeDocument/2006/customXml" ds:itemID="{ECB7EDBC-7236-44C4-BEF3-A40BAF0A7D32}">
+  <ds:schemaRefs>
+    <ds:schemaRef ds:uri="http://schemas.microsoft.com/sharepoint/v3/contenttype/forms"/>
+  </ds:schemaRefs>
+</ds:datastoreItem>
+</file>
+
+<file path=customXml/itemProps2.xml><?xml version="1.0" encoding="utf-8"?>
 <ds:datastoreItem xmlns:ds="http://schemas.openxmlformats.org/officeDocument/2006/customXml" ds:itemID="{F1A9E806-27C6-4670-A107-4BE0C63AC0D0}">
   <ds:schemaRefs>
     <ds:schemaRef ds:uri="57120940-f128-4520-8a16-a0e5923cb597"/>
@@ -9581,14 +9589,6 @@
     <ds:schemaRef ds:uri="http://schemas.microsoft.com/office/infopath/2007/PartnerControls"/>
     <ds:schemaRef ds:uri="http://schemas.openxmlformats.org/package/2006/metadata/core-properties"/>
     <ds:schemaRef ds:uri="http://www.w3.org/2001/XMLSchema"/>
-  </ds:schemaRefs>
-</ds:datastoreItem>
-</file>
-
-<file path=customXml/itemProps2.xml><?xml version="1.0" encoding="utf-8"?>
-<ds:datastoreItem xmlns:ds="http://schemas.openxmlformats.org/officeDocument/2006/customXml" ds:itemID="{ECB7EDBC-7236-44C4-BEF3-A40BAF0A7D32}">
-  <ds:schemaRefs>
-    <ds:schemaRef ds:uri="http://schemas.microsoft.com/sharepoint/v3/contenttype/forms"/>
   </ds:schemaRefs>
 </ds:datastoreItem>
 </file>

</xml_diff>